<commit_message>
Update Tesla Stock Price PPT.pptx
</commit_message>
<xml_diff>
--- a/Tesla Stock Price/Tesla Stock Price PPT.pptx
+++ b/Tesla Stock Price/Tesla Stock Price PPT.pptx
@@ -130,7 +130,7 @@
           <p:cNvPr id="2" name="Title 1">
             <a:extLst>
               <a:ext uri="{FF2B5EF4-FFF2-40B4-BE49-F238E27FC236}">
-                <a16:creationId xmlns:a16="http://schemas.microsoft.com/office/drawing/2014/main" xmlns="" id="{00D1A6E6-075E-4828-AF88-09BD0A74259E}"/>
+                <a16:creationId xmlns="" xmlns:a16="http://schemas.microsoft.com/office/drawing/2014/main" id="{00D1A6E6-075E-4828-AF88-09BD0A74259E}"/>
               </a:ext>
             </a:extLst>
           </p:cNvPr>
@@ -167,7 +167,7 @@
           <p:cNvPr id="3" name="Subtitle 2">
             <a:extLst>
               <a:ext uri="{FF2B5EF4-FFF2-40B4-BE49-F238E27FC236}">
-                <a16:creationId xmlns:a16="http://schemas.microsoft.com/office/drawing/2014/main" xmlns="" id="{5F3800DB-487B-4E23-AC0B-90C9ED4E1076}"/>
+                <a16:creationId xmlns="" xmlns:a16="http://schemas.microsoft.com/office/drawing/2014/main" id="{5F3800DB-487B-4E23-AC0B-90C9ED4E1076}"/>
               </a:ext>
             </a:extLst>
           </p:cNvPr>
@@ -237,7 +237,7 @@
           <p:cNvPr id="4" name="Date Placeholder 3">
             <a:extLst>
               <a:ext uri="{FF2B5EF4-FFF2-40B4-BE49-F238E27FC236}">
-                <a16:creationId xmlns:a16="http://schemas.microsoft.com/office/drawing/2014/main" xmlns="" id="{664DF5B1-3694-42A9-866E-9F1FF6CF0C01}"/>
+                <a16:creationId xmlns="" xmlns:a16="http://schemas.microsoft.com/office/drawing/2014/main" id="{664DF5B1-3694-42A9-866E-9F1FF6CF0C01}"/>
               </a:ext>
             </a:extLst>
           </p:cNvPr>
@@ -255,7 +255,8 @@
           <a:p>
             <a:fld id="{EED1C14C-A143-42F5-B247-D0E800131009}" type="datetimeFigureOut">
               <a:rPr lang="en-US" smtClean="0"/>
-              <a:t>23-Jun-20</a:t>
+              <a:pPr/>
+              <a:t>3/31/2021</a:t>
             </a:fld>
             <a:endParaRPr lang="en-US"/>
           </a:p>
@@ -266,7 +267,7 @@
           <p:cNvPr id="5" name="Footer Placeholder 4">
             <a:extLst>
               <a:ext uri="{FF2B5EF4-FFF2-40B4-BE49-F238E27FC236}">
-                <a16:creationId xmlns:a16="http://schemas.microsoft.com/office/drawing/2014/main" xmlns="" id="{54718E67-8162-4BE0-9B01-22B89A120ADC}"/>
+                <a16:creationId xmlns="" xmlns:a16="http://schemas.microsoft.com/office/drawing/2014/main" id="{54718E67-8162-4BE0-9B01-22B89A120ADC}"/>
               </a:ext>
             </a:extLst>
           </p:cNvPr>
@@ -291,7 +292,7 @@
           <p:cNvPr id="6" name="Slide Number Placeholder 5">
             <a:extLst>
               <a:ext uri="{FF2B5EF4-FFF2-40B4-BE49-F238E27FC236}">
-                <a16:creationId xmlns:a16="http://schemas.microsoft.com/office/drawing/2014/main" xmlns="" id="{91568B9D-A8C9-40C5-85B0-14F435F39C81}"/>
+                <a16:creationId xmlns="" xmlns:a16="http://schemas.microsoft.com/office/drawing/2014/main" id="{91568B9D-A8C9-40C5-85B0-14F435F39C81}"/>
               </a:ext>
             </a:extLst>
           </p:cNvPr>
@@ -309,6 +310,7 @@
           <a:p>
             <a:fld id="{5B03D32D-F1BC-4E9C-97E1-36CFF5B22341}" type="slidenum">
               <a:rPr lang="en-US" smtClean="0"/>
+              <a:pPr/>
               <a:t>‹#›</a:t>
             </a:fld>
             <a:endParaRPr lang="en-US"/>
@@ -318,7 +320,7 @@
     </p:spTree>
     <p:extLst>
       <p:ext uri="{BB962C8B-B14F-4D97-AF65-F5344CB8AC3E}">
-        <p14:creationId xmlns:p14="http://schemas.microsoft.com/office/powerpoint/2010/main" val="896738362"/>
+        <p14:creationId xmlns:p14="http://schemas.microsoft.com/office/powerpoint/2010/main" xmlns="" val="896738362"/>
       </p:ext>
     </p:extLst>
   </p:cSld>
@@ -350,7 +352,7 @@
           <p:cNvPr id="2" name="Title 1">
             <a:extLst>
               <a:ext uri="{FF2B5EF4-FFF2-40B4-BE49-F238E27FC236}">
-                <a16:creationId xmlns:a16="http://schemas.microsoft.com/office/drawing/2014/main" xmlns="" id="{AA6536FE-B6CA-4D45-A719-6B51F3FF6D96}"/>
+                <a16:creationId xmlns="" xmlns:a16="http://schemas.microsoft.com/office/drawing/2014/main" id="{AA6536FE-B6CA-4D45-A719-6B51F3FF6D96}"/>
               </a:ext>
             </a:extLst>
           </p:cNvPr>
@@ -378,7 +380,7 @@
           <p:cNvPr id="3" name="Vertical Text Placeholder 2">
             <a:extLst>
               <a:ext uri="{FF2B5EF4-FFF2-40B4-BE49-F238E27FC236}">
-                <a16:creationId xmlns:a16="http://schemas.microsoft.com/office/drawing/2014/main" xmlns="" id="{DFB9388C-63B0-4DA8-97D0-BEEDCF401CA2}"/>
+                <a16:creationId xmlns="" xmlns:a16="http://schemas.microsoft.com/office/drawing/2014/main" id="{DFB9388C-63B0-4DA8-97D0-BEEDCF401CA2}"/>
               </a:ext>
             </a:extLst>
           </p:cNvPr>
@@ -435,7 +437,7 @@
           <p:cNvPr id="4" name="Date Placeholder 3">
             <a:extLst>
               <a:ext uri="{FF2B5EF4-FFF2-40B4-BE49-F238E27FC236}">
-                <a16:creationId xmlns:a16="http://schemas.microsoft.com/office/drawing/2014/main" xmlns="" id="{3ED9BDB0-2A2B-43AC-965A-A9E7E7F741CD}"/>
+                <a16:creationId xmlns="" xmlns:a16="http://schemas.microsoft.com/office/drawing/2014/main" id="{3ED9BDB0-2A2B-43AC-965A-A9E7E7F741CD}"/>
               </a:ext>
             </a:extLst>
           </p:cNvPr>
@@ -453,7 +455,8 @@
           <a:p>
             <a:fld id="{EED1C14C-A143-42F5-B247-D0E800131009}" type="datetimeFigureOut">
               <a:rPr lang="en-US" smtClean="0"/>
-              <a:t>23-Jun-20</a:t>
+              <a:pPr/>
+              <a:t>3/31/2021</a:t>
             </a:fld>
             <a:endParaRPr lang="en-US"/>
           </a:p>
@@ -464,7 +467,7 @@
           <p:cNvPr id="5" name="Footer Placeholder 4">
             <a:extLst>
               <a:ext uri="{FF2B5EF4-FFF2-40B4-BE49-F238E27FC236}">
-                <a16:creationId xmlns:a16="http://schemas.microsoft.com/office/drawing/2014/main" xmlns="" id="{B67DA7C3-2A5B-4BED-A540-9136486CC5B6}"/>
+                <a16:creationId xmlns="" xmlns:a16="http://schemas.microsoft.com/office/drawing/2014/main" id="{B67DA7C3-2A5B-4BED-A540-9136486CC5B6}"/>
               </a:ext>
             </a:extLst>
           </p:cNvPr>
@@ -489,7 +492,7 @@
           <p:cNvPr id="6" name="Slide Number Placeholder 5">
             <a:extLst>
               <a:ext uri="{FF2B5EF4-FFF2-40B4-BE49-F238E27FC236}">
-                <a16:creationId xmlns:a16="http://schemas.microsoft.com/office/drawing/2014/main" xmlns="" id="{835888E8-31D6-4E51-9228-0D6066FED555}"/>
+                <a16:creationId xmlns="" xmlns:a16="http://schemas.microsoft.com/office/drawing/2014/main" id="{835888E8-31D6-4E51-9228-0D6066FED555}"/>
               </a:ext>
             </a:extLst>
           </p:cNvPr>
@@ -507,6 +510,7 @@
           <a:p>
             <a:fld id="{5B03D32D-F1BC-4E9C-97E1-36CFF5B22341}" type="slidenum">
               <a:rPr lang="en-US" smtClean="0"/>
+              <a:pPr/>
               <a:t>‹#›</a:t>
             </a:fld>
             <a:endParaRPr lang="en-US"/>
@@ -516,7 +520,7 @@
     </p:spTree>
     <p:extLst>
       <p:ext uri="{BB962C8B-B14F-4D97-AF65-F5344CB8AC3E}">
-        <p14:creationId xmlns:p14="http://schemas.microsoft.com/office/powerpoint/2010/main" val="3471160673"/>
+        <p14:creationId xmlns:p14="http://schemas.microsoft.com/office/powerpoint/2010/main" xmlns="" val="3471160673"/>
       </p:ext>
     </p:extLst>
   </p:cSld>
@@ -548,7 +552,7 @@
           <p:cNvPr id="2" name="Vertical Title 1">
             <a:extLst>
               <a:ext uri="{FF2B5EF4-FFF2-40B4-BE49-F238E27FC236}">
-                <a16:creationId xmlns:a16="http://schemas.microsoft.com/office/drawing/2014/main" xmlns="" id="{E3D010CA-6776-433E-8E25-97899E08288F}"/>
+                <a16:creationId xmlns="" xmlns:a16="http://schemas.microsoft.com/office/drawing/2014/main" id="{E3D010CA-6776-433E-8E25-97899E08288F}"/>
               </a:ext>
             </a:extLst>
           </p:cNvPr>
@@ -581,7 +585,7 @@
           <p:cNvPr id="3" name="Vertical Text Placeholder 2">
             <a:extLst>
               <a:ext uri="{FF2B5EF4-FFF2-40B4-BE49-F238E27FC236}">
-                <a16:creationId xmlns:a16="http://schemas.microsoft.com/office/drawing/2014/main" xmlns="" id="{06391E6E-3CF5-4535-B37E-E30058EA2848}"/>
+                <a16:creationId xmlns="" xmlns:a16="http://schemas.microsoft.com/office/drawing/2014/main" id="{06391E6E-3CF5-4535-B37E-E30058EA2848}"/>
               </a:ext>
             </a:extLst>
           </p:cNvPr>
@@ -643,7 +647,7 @@
           <p:cNvPr id="4" name="Date Placeholder 3">
             <a:extLst>
               <a:ext uri="{FF2B5EF4-FFF2-40B4-BE49-F238E27FC236}">
-                <a16:creationId xmlns:a16="http://schemas.microsoft.com/office/drawing/2014/main" xmlns="" id="{9A6ADEE3-AAA7-4846-8EC6-84B1537C1D74}"/>
+                <a16:creationId xmlns="" xmlns:a16="http://schemas.microsoft.com/office/drawing/2014/main" id="{9A6ADEE3-AAA7-4846-8EC6-84B1537C1D74}"/>
               </a:ext>
             </a:extLst>
           </p:cNvPr>
@@ -661,7 +665,8 @@
           <a:p>
             <a:fld id="{EED1C14C-A143-42F5-B247-D0E800131009}" type="datetimeFigureOut">
               <a:rPr lang="en-US" smtClean="0"/>
-              <a:t>23-Jun-20</a:t>
+              <a:pPr/>
+              <a:t>3/31/2021</a:t>
             </a:fld>
             <a:endParaRPr lang="en-US"/>
           </a:p>
@@ -672,7 +677,7 @@
           <p:cNvPr id="5" name="Footer Placeholder 4">
             <a:extLst>
               <a:ext uri="{FF2B5EF4-FFF2-40B4-BE49-F238E27FC236}">
-                <a16:creationId xmlns:a16="http://schemas.microsoft.com/office/drawing/2014/main" xmlns="" id="{001DABD6-6E60-4895-89B1-3604A484D2DD}"/>
+                <a16:creationId xmlns="" xmlns:a16="http://schemas.microsoft.com/office/drawing/2014/main" id="{001DABD6-6E60-4895-89B1-3604A484D2DD}"/>
               </a:ext>
             </a:extLst>
           </p:cNvPr>
@@ -697,7 +702,7 @@
           <p:cNvPr id="6" name="Slide Number Placeholder 5">
             <a:extLst>
               <a:ext uri="{FF2B5EF4-FFF2-40B4-BE49-F238E27FC236}">
-                <a16:creationId xmlns:a16="http://schemas.microsoft.com/office/drawing/2014/main" xmlns="" id="{59A4D314-6D1C-4A42-A445-B77646B2B295}"/>
+                <a16:creationId xmlns="" xmlns:a16="http://schemas.microsoft.com/office/drawing/2014/main" id="{59A4D314-6D1C-4A42-A445-B77646B2B295}"/>
               </a:ext>
             </a:extLst>
           </p:cNvPr>
@@ -715,6 +720,7 @@
           <a:p>
             <a:fld id="{5B03D32D-F1BC-4E9C-97E1-36CFF5B22341}" type="slidenum">
               <a:rPr lang="en-US" smtClean="0"/>
+              <a:pPr/>
               <a:t>‹#›</a:t>
             </a:fld>
             <a:endParaRPr lang="en-US"/>
@@ -724,7 +730,7 @@
     </p:spTree>
     <p:extLst>
       <p:ext uri="{BB962C8B-B14F-4D97-AF65-F5344CB8AC3E}">
-        <p14:creationId xmlns:p14="http://schemas.microsoft.com/office/powerpoint/2010/main" val="4195526759"/>
+        <p14:creationId xmlns:p14="http://schemas.microsoft.com/office/powerpoint/2010/main" xmlns="" val="4195526759"/>
       </p:ext>
     </p:extLst>
   </p:cSld>
@@ -756,7 +762,7 @@
           <p:cNvPr id="2" name="Title 1">
             <a:extLst>
               <a:ext uri="{FF2B5EF4-FFF2-40B4-BE49-F238E27FC236}">
-                <a16:creationId xmlns:a16="http://schemas.microsoft.com/office/drawing/2014/main" xmlns="" id="{6B34D5D7-9AEB-44F2-8A04-0694BE1520D8}"/>
+                <a16:creationId xmlns="" xmlns:a16="http://schemas.microsoft.com/office/drawing/2014/main" id="{6B34D5D7-9AEB-44F2-8A04-0694BE1520D8}"/>
               </a:ext>
             </a:extLst>
           </p:cNvPr>
@@ -784,7 +790,7 @@
           <p:cNvPr id="3" name="Content Placeholder 2">
             <a:extLst>
               <a:ext uri="{FF2B5EF4-FFF2-40B4-BE49-F238E27FC236}">
-                <a16:creationId xmlns:a16="http://schemas.microsoft.com/office/drawing/2014/main" xmlns="" id="{F3CE933F-693D-4770-8DC4-A5A086AC8ACE}"/>
+                <a16:creationId xmlns="" xmlns:a16="http://schemas.microsoft.com/office/drawing/2014/main" id="{F3CE933F-693D-4770-8DC4-A5A086AC8ACE}"/>
               </a:ext>
             </a:extLst>
           </p:cNvPr>
@@ -841,7 +847,7 @@
           <p:cNvPr id="4" name="Date Placeholder 3">
             <a:extLst>
               <a:ext uri="{FF2B5EF4-FFF2-40B4-BE49-F238E27FC236}">
-                <a16:creationId xmlns:a16="http://schemas.microsoft.com/office/drawing/2014/main" xmlns="" id="{02A7849A-1CE6-4F5C-95D7-EA8DA5EE5551}"/>
+                <a16:creationId xmlns="" xmlns:a16="http://schemas.microsoft.com/office/drawing/2014/main" id="{02A7849A-1CE6-4F5C-95D7-EA8DA5EE5551}"/>
               </a:ext>
             </a:extLst>
           </p:cNvPr>
@@ -859,7 +865,8 @@
           <a:p>
             <a:fld id="{EED1C14C-A143-42F5-B247-D0E800131009}" type="datetimeFigureOut">
               <a:rPr lang="en-US" smtClean="0"/>
-              <a:t>23-Jun-20</a:t>
+              <a:pPr/>
+              <a:t>3/31/2021</a:t>
             </a:fld>
             <a:endParaRPr lang="en-US"/>
           </a:p>
@@ -870,7 +877,7 @@
           <p:cNvPr id="5" name="Footer Placeholder 4">
             <a:extLst>
               <a:ext uri="{FF2B5EF4-FFF2-40B4-BE49-F238E27FC236}">
-                <a16:creationId xmlns:a16="http://schemas.microsoft.com/office/drawing/2014/main" xmlns="" id="{39FE1FD0-B95E-4CF6-9A27-0F91F96DAE00}"/>
+                <a16:creationId xmlns="" xmlns:a16="http://schemas.microsoft.com/office/drawing/2014/main" id="{39FE1FD0-B95E-4CF6-9A27-0F91F96DAE00}"/>
               </a:ext>
             </a:extLst>
           </p:cNvPr>
@@ -895,7 +902,7 @@
           <p:cNvPr id="6" name="Slide Number Placeholder 5">
             <a:extLst>
               <a:ext uri="{FF2B5EF4-FFF2-40B4-BE49-F238E27FC236}">
-                <a16:creationId xmlns:a16="http://schemas.microsoft.com/office/drawing/2014/main" xmlns="" id="{596123BE-5891-49D6-A758-867A98F38D77}"/>
+                <a16:creationId xmlns="" xmlns:a16="http://schemas.microsoft.com/office/drawing/2014/main" id="{596123BE-5891-49D6-A758-867A98F38D77}"/>
               </a:ext>
             </a:extLst>
           </p:cNvPr>
@@ -913,6 +920,7 @@
           <a:p>
             <a:fld id="{5B03D32D-F1BC-4E9C-97E1-36CFF5B22341}" type="slidenum">
               <a:rPr lang="en-US" smtClean="0"/>
+              <a:pPr/>
               <a:t>‹#›</a:t>
             </a:fld>
             <a:endParaRPr lang="en-US"/>
@@ -922,7 +930,7 @@
     </p:spTree>
     <p:extLst>
       <p:ext uri="{BB962C8B-B14F-4D97-AF65-F5344CB8AC3E}">
-        <p14:creationId xmlns:p14="http://schemas.microsoft.com/office/powerpoint/2010/main" val="2359722614"/>
+        <p14:creationId xmlns:p14="http://schemas.microsoft.com/office/powerpoint/2010/main" xmlns="" val="2359722614"/>
       </p:ext>
     </p:extLst>
   </p:cSld>
@@ -954,7 +962,7 @@
           <p:cNvPr id="2" name="Title 1">
             <a:extLst>
               <a:ext uri="{FF2B5EF4-FFF2-40B4-BE49-F238E27FC236}">
-                <a16:creationId xmlns:a16="http://schemas.microsoft.com/office/drawing/2014/main" xmlns="" id="{4BA85FC7-1BEA-438E-A0A7-88FF55112279}"/>
+                <a16:creationId xmlns="" xmlns:a16="http://schemas.microsoft.com/office/drawing/2014/main" id="{4BA85FC7-1BEA-438E-A0A7-88FF55112279}"/>
               </a:ext>
             </a:extLst>
           </p:cNvPr>
@@ -991,7 +999,7 @@
           <p:cNvPr id="3" name="Text Placeholder 2">
             <a:extLst>
               <a:ext uri="{FF2B5EF4-FFF2-40B4-BE49-F238E27FC236}">
-                <a16:creationId xmlns:a16="http://schemas.microsoft.com/office/drawing/2014/main" xmlns="" id="{0BD5F5C0-417B-4A28-8AE9-A79AC74A6250}"/>
+                <a16:creationId xmlns="" xmlns:a16="http://schemas.microsoft.com/office/drawing/2014/main" id="{0BD5F5C0-417B-4A28-8AE9-A79AC74A6250}"/>
               </a:ext>
             </a:extLst>
           </p:cNvPr>
@@ -1116,7 +1124,7 @@
           <p:cNvPr id="4" name="Date Placeholder 3">
             <a:extLst>
               <a:ext uri="{FF2B5EF4-FFF2-40B4-BE49-F238E27FC236}">
-                <a16:creationId xmlns:a16="http://schemas.microsoft.com/office/drawing/2014/main" xmlns="" id="{34BC6257-C490-4059-9E97-16E46673C65A}"/>
+                <a16:creationId xmlns="" xmlns:a16="http://schemas.microsoft.com/office/drawing/2014/main" id="{34BC6257-C490-4059-9E97-16E46673C65A}"/>
               </a:ext>
             </a:extLst>
           </p:cNvPr>
@@ -1134,7 +1142,8 @@
           <a:p>
             <a:fld id="{EED1C14C-A143-42F5-B247-D0E800131009}" type="datetimeFigureOut">
               <a:rPr lang="en-US" smtClean="0"/>
-              <a:t>23-Jun-20</a:t>
+              <a:pPr/>
+              <a:t>3/31/2021</a:t>
             </a:fld>
             <a:endParaRPr lang="en-US"/>
           </a:p>
@@ -1145,7 +1154,7 @@
           <p:cNvPr id="5" name="Footer Placeholder 4">
             <a:extLst>
               <a:ext uri="{FF2B5EF4-FFF2-40B4-BE49-F238E27FC236}">
-                <a16:creationId xmlns:a16="http://schemas.microsoft.com/office/drawing/2014/main" xmlns="" id="{7A4051CD-74EC-43C1-9F21-D33BD297FC2D}"/>
+                <a16:creationId xmlns="" xmlns:a16="http://schemas.microsoft.com/office/drawing/2014/main" id="{7A4051CD-74EC-43C1-9F21-D33BD297FC2D}"/>
               </a:ext>
             </a:extLst>
           </p:cNvPr>
@@ -1170,7 +1179,7 @@
           <p:cNvPr id="6" name="Slide Number Placeholder 5">
             <a:extLst>
               <a:ext uri="{FF2B5EF4-FFF2-40B4-BE49-F238E27FC236}">
-                <a16:creationId xmlns:a16="http://schemas.microsoft.com/office/drawing/2014/main" xmlns="" id="{8BC95141-29DC-41BA-BE25-E899055F3178}"/>
+                <a16:creationId xmlns="" xmlns:a16="http://schemas.microsoft.com/office/drawing/2014/main" id="{8BC95141-29DC-41BA-BE25-E899055F3178}"/>
               </a:ext>
             </a:extLst>
           </p:cNvPr>
@@ -1188,6 +1197,7 @@
           <a:p>
             <a:fld id="{5B03D32D-F1BC-4E9C-97E1-36CFF5B22341}" type="slidenum">
               <a:rPr lang="en-US" smtClean="0"/>
+              <a:pPr/>
               <a:t>‹#›</a:t>
             </a:fld>
             <a:endParaRPr lang="en-US"/>
@@ -1197,7 +1207,7 @@
     </p:spTree>
     <p:extLst>
       <p:ext uri="{BB962C8B-B14F-4D97-AF65-F5344CB8AC3E}">
-        <p14:creationId xmlns:p14="http://schemas.microsoft.com/office/powerpoint/2010/main" val="694532379"/>
+        <p14:creationId xmlns:p14="http://schemas.microsoft.com/office/powerpoint/2010/main" xmlns="" val="694532379"/>
       </p:ext>
     </p:extLst>
   </p:cSld>
@@ -1229,7 +1239,7 @@
           <p:cNvPr id="2" name="Title 1">
             <a:extLst>
               <a:ext uri="{FF2B5EF4-FFF2-40B4-BE49-F238E27FC236}">
-                <a16:creationId xmlns:a16="http://schemas.microsoft.com/office/drawing/2014/main" xmlns="" id="{2134FC21-AE04-4050-80E6-D9DCA4B50C9B}"/>
+                <a16:creationId xmlns="" xmlns:a16="http://schemas.microsoft.com/office/drawing/2014/main" id="{2134FC21-AE04-4050-80E6-D9DCA4B50C9B}"/>
               </a:ext>
             </a:extLst>
           </p:cNvPr>
@@ -1257,7 +1267,7 @@
           <p:cNvPr id="3" name="Content Placeholder 2">
             <a:extLst>
               <a:ext uri="{FF2B5EF4-FFF2-40B4-BE49-F238E27FC236}">
-                <a16:creationId xmlns:a16="http://schemas.microsoft.com/office/drawing/2014/main" xmlns="" id="{51885F7E-EF45-48F7-9E54-C6806D0E9638}"/>
+                <a16:creationId xmlns="" xmlns:a16="http://schemas.microsoft.com/office/drawing/2014/main" id="{51885F7E-EF45-48F7-9E54-C6806D0E9638}"/>
               </a:ext>
             </a:extLst>
           </p:cNvPr>
@@ -1319,7 +1329,7 @@
           <p:cNvPr id="4" name="Content Placeholder 3">
             <a:extLst>
               <a:ext uri="{FF2B5EF4-FFF2-40B4-BE49-F238E27FC236}">
-                <a16:creationId xmlns:a16="http://schemas.microsoft.com/office/drawing/2014/main" xmlns="" id="{7724501F-6ED5-4112-B037-D3E9F8CF2C81}"/>
+                <a16:creationId xmlns="" xmlns:a16="http://schemas.microsoft.com/office/drawing/2014/main" id="{7724501F-6ED5-4112-B037-D3E9F8CF2C81}"/>
               </a:ext>
             </a:extLst>
           </p:cNvPr>
@@ -1381,7 +1391,7 @@
           <p:cNvPr id="5" name="Date Placeholder 4">
             <a:extLst>
               <a:ext uri="{FF2B5EF4-FFF2-40B4-BE49-F238E27FC236}">
-                <a16:creationId xmlns:a16="http://schemas.microsoft.com/office/drawing/2014/main" xmlns="" id="{E861E48C-176E-4E60-8CB3-5425169963CD}"/>
+                <a16:creationId xmlns="" xmlns:a16="http://schemas.microsoft.com/office/drawing/2014/main" id="{E861E48C-176E-4E60-8CB3-5425169963CD}"/>
               </a:ext>
             </a:extLst>
           </p:cNvPr>
@@ -1399,7 +1409,8 @@
           <a:p>
             <a:fld id="{EED1C14C-A143-42F5-B247-D0E800131009}" type="datetimeFigureOut">
               <a:rPr lang="en-US" smtClean="0"/>
-              <a:t>23-Jun-20</a:t>
+              <a:pPr/>
+              <a:t>3/31/2021</a:t>
             </a:fld>
             <a:endParaRPr lang="en-US"/>
           </a:p>
@@ -1410,7 +1421,7 @@
           <p:cNvPr id="6" name="Footer Placeholder 5">
             <a:extLst>
               <a:ext uri="{FF2B5EF4-FFF2-40B4-BE49-F238E27FC236}">
-                <a16:creationId xmlns:a16="http://schemas.microsoft.com/office/drawing/2014/main" xmlns="" id="{5852202B-C929-4B39-AF47-D17C38F868E8}"/>
+                <a16:creationId xmlns="" xmlns:a16="http://schemas.microsoft.com/office/drawing/2014/main" id="{5852202B-C929-4B39-AF47-D17C38F868E8}"/>
               </a:ext>
             </a:extLst>
           </p:cNvPr>
@@ -1435,7 +1446,7 @@
           <p:cNvPr id="7" name="Slide Number Placeholder 6">
             <a:extLst>
               <a:ext uri="{FF2B5EF4-FFF2-40B4-BE49-F238E27FC236}">
-                <a16:creationId xmlns:a16="http://schemas.microsoft.com/office/drawing/2014/main" xmlns="" id="{7DEEEBF3-930A-4A23-810D-C1880E7A6D29}"/>
+                <a16:creationId xmlns="" xmlns:a16="http://schemas.microsoft.com/office/drawing/2014/main" id="{7DEEEBF3-930A-4A23-810D-C1880E7A6D29}"/>
               </a:ext>
             </a:extLst>
           </p:cNvPr>
@@ -1453,6 +1464,7 @@
           <a:p>
             <a:fld id="{5B03D32D-F1BC-4E9C-97E1-36CFF5B22341}" type="slidenum">
               <a:rPr lang="en-US" smtClean="0"/>
+              <a:pPr/>
               <a:t>‹#›</a:t>
             </a:fld>
             <a:endParaRPr lang="en-US"/>
@@ -1462,7 +1474,7 @@
     </p:spTree>
     <p:extLst>
       <p:ext uri="{BB962C8B-B14F-4D97-AF65-F5344CB8AC3E}">
-        <p14:creationId xmlns:p14="http://schemas.microsoft.com/office/powerpoint/2010/main" val="1723384594"/>
+        <p14:creationId xmlns:p14="http://schemas.microsoft.com/office/powerpoint/2010/main" xmlns="" val="1723384594"/>
       </p:ext>
     </p:extLst>
   </p:cSld>
@@ -1494,7 +1506,7 @@
           <p:cNvPr id="2" name="Title 1">
             <a:extLst>
               <a:ext uri="{FF2B5EF4-FFF2-40B4-BE49-F238E27FC236}">
-                <a16:creationId xmlns:a16="http://schemas.microsoft.com/office/drawing/2014/main" xmlns="" id="{40448E08-A828-430D-B8A6-7302E570AD2B}"/>
+                <a16:creationId xmlns="" xmlns:a16="http://schemas.microsoft.com/office/drawing/2014/main" id="{40448E08-A828-430D-B8A6-7302E570AD2B}"/>
               </a:ext>
             </a:extLst>
           </p:cNvPr>
@@ -1527,7 +1539,7 @@
           <p:cNvPr id="3" name="Text Placeholder 2">
             <a:extLst>
               <a:ext uri="{FF2B5EF4-FFF2-40B4-BE49-F238E27FC236}">
-                <a16:creationId xmlns:a16="http://schemas.microsoft.com/office/drawing/2014/main" xmlns="" id="{71FF5402-465C-4E68-BF7E-BFE1177B55A2}"/>
+                <a16:creationId xmlns="" xmlns:a16="http://schemas.microsoft.com/office/drawing/2014/main" id="{71FF5402-465C-4E68-BF7E-BFE1177B55A2}"/>
               </a:ext>
             </a:extLst>
           </p:cNvPr>
@@ -1598,7 +1610,7 @@
           <p:cNvPr id="4" name="Content Placeholder 3">
             <a:extLst>
               <a:ext uri="{FF2B5EF4-FFF2-40B4-BE49-F238E27FC236}">
-                <a16:creationId xmlns:a16="http://schemas.microsoft.com/office/drawing/2014/main" xmlns="" id="{469B917D-5EC9-44FC-B8A7-9ADF4ADC4FAB}"/>
+                <a16:creationId xmlns="" xmlns:a16="http://schemas.microsoft.com/office/drawing/2014/main" id="{469B917D-5EC9-44FC-B8A7-9ADF4ADC4FAB}"/>
               </a:ext>
             </a:extLst>
           </p:cNvPr>
@@ -1660,7 +1672,7 @@
           <p:cNvPr id="5" name="Text Placeholder 4">
             <a:extLst>
               <a:ext uri="{FF2B5EF4-FFF2-40B4-BE49-F238E27FC236}">
-                <a16:creationId xmlns:a16="http://schemas.microsoft.com/office/drawing/2014/main" xmlns="" id="{43DCF5D4-E55C-42FF-A7E5-2466DE35B8C0}"/>
+                <a16:creationId xmlns="" xmlns:a16="http://schemas.microsoft.com/office/drawing/2014/main" id="{43DCF5D4-E55C-42FF-A7E5-2466DE35B8C0}"/>
               </a:ext>
             </a:extLst>
           </p:cNvPr>
@@ -1731,7 +1743,7 @@
           <p:cNvPr id="6" name="Content Placeholder 5">
             <a:extLst>
               <a:ext uri="{FF2B5EF4-FFF2-40B4-BE49-F238E27FC236}">
-                <a16:creationId xmlns:a16="http://schemas.microsoft.com/office/drawing/2014/main" xmlns="" id="{B7579A7F-77F4-4169-8D51-212344199842}"/>
+                <a16:creationId xmlns="" xmlns:a16="http://schemas.microsoft.com/office/drawing/2014/main" id="{B7579A7F-77F4-4169-8D51-212344199842}"/>
               </a:ext>
             </a:extLst>
           </p:cNvPr>
@@ -1793,7 +1805,7 @@
           <p:cNvPr id="7" name="Date Placeholder 6">
             <a:extLst>
               <a:ext uri="{FF2B5EF4-FFF2-40B4-BE49-F238E27FC236}">
-                <a16:creationId xmlns:a16="http://schemas.microsoft.com/office/drawing/2014/main" xmlns="" id="{2A735923-3BB5-4F33-8E76-56665E95B55A}"/>
+                <a16:creationId xmlns="" xmlns:a16="http://schemas.microsoft.com/office/drawing/2014/main" id="{2A735923-3BB5-4F33-8E76-56665E95B55A}"/>
               </a:ext>
             </a:extLst>
           </p:cNvPr>
@@ -1811,7 +1823,8 @@
           <a:p>
             <a:fld id="{EED1C14C-A143-42F5-B247-D0E800131009}" type="datetimeFigureOut">
               <a:rPr lang="en-US" smtClean="0"/>
-              <a:t>23-Jun-20</a:t>
+              <a:pPr/>
+              <a:t>3/31/2021</a:t>
             </a:fld>
             <a:endParaRPr lang="en-US"/>
           </a:p>
@@ -1822,7 +1835,7 @@
           <p:cNvPr id="8" name="Footer Placeholder 7">
             <a:extLst>
               <a:ext uri="{FF2B5EF4-FFF2-40B4-BE49-F238E27FC236}">
-                <a16:creationId xmlns:a16="http://schemas.microsoft.com/office/drawing/2014/main" xmlns="" id="{FA43FC79-7089-4373-88DC-12501E78201F}"/>
+                <a16:creationId xmlns="" xmlns:a16="http://schemas.microsoft.com/office/drawing/2014/main" id="{FA43FC79-7089-4373-88DC-12501E78201F}"/>
               </a:ext>
             </a:extLst>
           </p:cNvPr>
@@ -1847,7 +1860,7 @@
           <p:cNvPr id="9" name="Slide Number Placeholder 8">
             <a:extLst>
               <a:ext uri="{FF2B5EF4-FFF2-40B4-BE49-F238E27FC236}">
-                <a16:creationId xmlns:a16="http://schemas.microsoft.com/office/drawing/2014/main" xmlns="" id="{B4E0BEB1-B009-47B7-B159-DE05E615E710}"/>
+                <a16:creationId xmlns="" xmlns:a16="http://schemas.microsoft.com/office/drawing/2014/main" id="{B4E0BEB1-B009-47B7-B159-DE05E615E710}"/>
               </a:ext>
             </a:extLst>
           </p:cNvPr>
@@ -1865,6 +1878,7 @@
           <a:p>
             <a:fld id="{5B03D32D-F1BC-4E9C-97E1-36CFF5B22341}" type="slidenum">
               <a:rPr lang="en-US" smtClean="0"/>
+              <a:pPr/>
               <a:t>‹#›</a:t>
             </a:fld>
             <a:endParaRPr lang="en-US"/>
@@ -1874,7 +1888,7 @@
     </p:spTree>
     <p:extLst>
       <p:ext uri="{BB962C8B-B14F-4D97-AF65-F5344CB8AC3E}">
-        <p14:creationId xmlns:p14="http://schemas.microsoft.com/office/powerpoint/2010/main" val="2419726589"/>
+        <p14:creationId xmlns:p14="http://schemas.microsoft.com/office/powerpoint/2010/main" xmlns="" val="2419726589"/>
       </p:ext>
     </p:extLst>
   </p:cSld>
@@ -1906,7 +1920,7 @@
           <p:cNvPr id="2" name="Title 1">
             <a:extLst>
               <a:ext uri="{FF2B5EF4-FFF2-40B4-BE49-F238E27FC236}">
-                <a16:creationId xmlns:a16="http://schemas.microsoft.com/office/drawing/2014/main" xmlns="" id="{1165FFCC-78CC-4E9D-A277-8230F27334A9}"/>
+                <a16:creationId xmlns="" xmlns:a16="http://schemas.microsoft.com/office/drawing/2014/main" id="{1165FFCC-78CC-4E9D-A277-8230F27334A9}"/>
               </a:ext>
             </a:extLst>
           </p:cNvPr>
@@ -1934,7 +1948,7 @@
           <p:cNvPr id="3" name="Date Placeholder 2">
             <a:extLst>
               <a:ext uri="{FF2B5EF4-FFF2-40B4-BE49-F238E27FC236}">
-                <a16:creationId xmlns:a16="http://schemas.microsoft.com/office/drawing/2014/main" xmlns="" id="{744CEFE7-D923-48C1-B2FE-8110829C69E3}"/>
+                <a16:creationId xmlns="" xmlns:a16="http://schemas.microsoft.com/office/drawing/2014/main" id="{744CEFE7-D923-48C1-B2FE-8110829C69E3}"/>
               </a:ext>
             </a:extLst>
           </p:cNvPr>
@@ -1952,7 +1966,8 @@
           <a:p>
             <a:fld id="{EED1C14C-A143-42F5-B247-D0E800131009}" type="datetimeFigureOut">
               <a:rPr lang="en-US" smtClean="0"/>
-              <a:t>23-Jun-20</a:t>
+              <a:pPr/>
+              <a:t>3/31/2021</a:t>
             </a:fld>
             <a:endParaRPr lang="en-US"/>
           </a:p>
@@ -1963,7 +1978,7 @@
           <p:cNvPr id="4" name="Footer Placeholder 3">
             <a:extLst>
               <a:ext uri="{FF2B5EF4-FFF2-40B4-BE49-F238E27FC236}">
-                <a16:creationId xmlns:a16="http://schemas.microsoft.com/office/drawing/2014/main" xmlns="" id="{A68F91C9-7841-4F7B-8F24-B5FF45B5B391}"/>
+                <a16:creationId xmlns="" xmlns:a16="http://schemas.microsoft.com/office/drawing/2014/main" id="{A68F91C9-7841-4F7B-8F24-B5FF45B5B391}"/>
               </a:ext>
             </a:extLst>
           </p:cNvPr>
@@ -1988,7 +2003,7 @@
           <p:cNvPr id="5" name="Slide Number Placeholder 4">
             <a:extLst>
               <a:ext uri="{FF2B5EF4-FFF2-40B4-BE49-F238E27FC236}">
-                <a16:creationId xmlns:a16="http://schemas.microsoft.com/office/drawing/2014/main" xmlns="" id="{B8896739-CF17-4867-A5ED-317AD19F5A3B}"/>
+                <a16:creationId xmlns="" xmlns:a16="http://schemas.microsoft.com/office/drawing/2014/main" id="{B8896739-CF17-4867-A5ED-317AD19F5A3B}"/>
               </a:ext>
             </a:extLst>
           </p:cNvPr>
@@ -2006,6 +2021,7 @@
           <a:p>
             <a:fld id="{5B03D32D-F1BC-4E9C-97E1-36CFF5B22341}" type="slidenum">
               <a:rPr lang="en-US" smtClean="0"/>
+              <a:pPr/>
               <a:t>‹#›</a:t>
             </a:fld>
             <a:endParaRPr lang="en-US"/>
@@ -2015,7 +2031,7 @@
     </p:spTree>
     <p:extLst>
       <p:ext uri="{BB962C8B-B14F-4D97-AF65-F5344CB8AC3E}">
-        <p14:creationId xmlns:p14="http://schemas.microsoft.com/office/powerpoint/2010/main" val="953114326"/>
+        <p14:creationId xmlns:p14="http://schemas.microsoft.com/office/powerpoint/2010/main" xmlns="" val="953114326"/>
       </p:ext>
     </p:extLst>
   </p:cSld>
@@ -2047,7 +2063,7 @@
           <p:cNvPr id="2" name="Date Placeholder 1">
             <a:extLst>
               <a:ext uri="{FF2B5EF4-FFF2-40B4-BE49-F238E27FC236}">
-                <a16:creationId xmlns:a16="http://schemas.microsoft.com/office/drawing/2014/main" xmlns="" id="{94E8942B-5ECF-4556-91C2-496E4C52EF8A}"/>
+                <a16:creationId xmlns="" xmlns:a16="http://schemas.microsoft.com/office/drawing/2014/main" id="{94E8942B-5ECF-4556-91C2-496E4C52EF8A}"/>
               </a:ext>
             </a:extLst>
           </p:cNvPr>
@@ -2065,7 +2081,8 @@
           <a:p>
             <a:fld id="{EED1C14C-A143-42F5-B247-D0E800131009}" type="datetimeFigureOut">
               <a:rPr lang="en-US" smtClean="0"/>
-              <a:t>23-Jun-20</a:t>
+              <a:pPr/>
+              <a:t>3/31/2021</a:t>
             </a:fld>
             <a:endParaRPr lang="en-US"/>
           </a:p>
@@ -2076,7 +2093,7 @@
           <p:cNvPr id="3" name="Footer Placeholder 2">
             <a:extLst>
               <a:ext uri="{FF2B5EF4-FFF2-40B4-BE49-F238E27FC236}">
-                <a16:creationId xmlns:a16="http://schemas.microsoft.com/office/drawing/2014/main" xmlns="" id="{3E1589EF-E9AD-45F7-BFBE-6F8AD3570337}"/>
+                <a16:creationId xmlns="" xmlns:a16="http://schemas.microsoft.com/office/drawing/2014/main" id="{3E1589EF-E9AD-45F7-BFBE-6F8AD3570337}"/>
               </a:ext>
             </a:extLst>
           </p:cNvPr>
@@ -2101,7 +2118,7 @@
           <p:cNvPr id="4" name="Slide Number Placeholder 3">
             <a:extLst>
               <a:ext uri="{FF2B5EF4-FFF2-40B4-BE49-F238E27FC236}">
-                <a16:creationId xmlns:a16="http://schemas.microsoft.com/office/drawing/2014/main" xmlns="" id="{6E18E0FA-5424-403C-8462-1B7C301C65D8}"/>
+                <a16:creationId xmlns="" xmlns:a16="http://schemas.microsoft.com/office/drawing/2014/main" id="{6E18E0FA-5424-403C-8462-1B7C301C65D8}"/>
               </a:ext>
             </a:extLst>
           </p:cNvPr>
@@ -2119,6 +2136,7 @@
           <a:p>
             <a:fld id="{5B03D32D-F1BC-4E9C-97E1-36CFF5B22341}" type="slidenum">
               <a:rPr lang="en-US" smtClean="0"/>
+              <a:pPr/>
               <a:t>‹#›</a:t>
             </a:fld>
             <a:endParaRPr lang="en-US"/>
@@ -2128,7 +2146,7 @@
     </p:spTree>
     <p:extLst>
       <p:ext uri="{BB962C8B-B14F-4D97-AF65-F5344CB8AC3E}">
-        <p14:creationId xmlns:p14="http://schemas.microsoft.com/office/powerpoint/2010/main" val="4246240454"/>
+        <p14:creationId xmlns:p14="http://schemas.microsoft.com/office/powerpoint/2010/main" xmlns="" val="4246240454"/>
       </p:ext>
     </p:extLst>
   </p:cSld>
@@ -2160,7 +2178,7 @@
           <p:cNvPr id="2" name="Title 1">
             <a:extLst>
               <a:ext uri="{FF2B5EF4-FFF2-40B4-BE49-F238E27FC236}">
-                <a16:creationId xmlns:a16="http://schemas.microsoft.com/office/drawing/2014/main" xmlns="" id="{5AB27A56-C315-441C-9002-DFD599AED26C}"/>
+                <a16:creationId xmlns="" xmlns:a16="http://schemas.microsoft.com/office/drawing/2014/main" id="{5AB27A56-C315-441C-9002-DFD599AED26C}"/>
               </a:ext>
             </a:extLst>
           </p:cNvPr>
@@ -2197,7 +2215,7 @@
           <p:cNvPr id="3" name="Content Placeholder 2">
             <a:extLst>
               <a:ext uri="{FF2B5EF4-FFF2-40B4-BE49-F238E27FC236}">
-                <a16:creationId xmlns:a16="http://schemas.microsoft.com/office/drawing/2014/main" xmlns="" id="{C9F57D9A-8037-4B31-951B-4675ADA69390}"/>
+                <a16:creationId xmlns="" xmlns:a16="http://schemas.microsoft.com/office/drawing/2014/main" id="{C9F57D9A-8037-4B31-951B-4675ADA69390}"/>
               </a:ext>
             </a:extLst>
           </p:cNvPr>
@@ -2287,7 +2305,7 @@
           <p:cNvPr id="4" name="Text Placeholder 3">
             <a:extLst>
               <a:ext uri="{FF2B5EF4-FFF2-40B4-BE49-F238E27FC236}">
-                <a16:creationId xmlns:a16="http://schemas.microsoft.com/office/drawing/2014/main" xmlns="" id="{2763141B-5121-4179-B3F6-529569122247}"/>
+                <a16:creationId xmlns="" xmlns:a16="http://schemas.microsoft.com/office/drawing/2014/main" id="{2763141B-5121-4179-B3F6-529569122247}"/>
               </a:ext>
             </a:extLst>
           </p:cNvPr>
@@ -2358,7 +2376,7 @@
           <p:cNvPr id="5" name="Date Placeholder 4">
             <a:extLst>
               <a:ext uri="{FF2B5EF4-FFF2-40B4-BE49-F238E27FC236}">
-                <a16:creationId xmlns:a16="http://schemas.microsoft.com/office/drawing/2014/main" xmlns="" id="{AA60C32E-3427-4696-A55A-56886EA24AEB}"/>
+                <a16:creationId xmlns="" xmlns:a16="http://schemas.microsoft.com/office/drawing/2014/main" id="{AA60C32E-3427-4696-A55A-56886EA24AEB}"/>
               </a:ext>
             </a:extLst>
           </p:cNvPr>
@@ -2376,7 +2394,8 @@
           <a:p>
             <a:fld id="{EED1C14C-A143-42F5-B247-D0E800131009}" type="datetimeFigureOut">
               <a:rPr lang="en-US" smtClean="0"/>
-              <a:t>23-Jun-20</a:t>
+              <a:pPr/>
+              <a:t>3/31/2021</a:t>
             </a:fld>
             <a:endParaRPr lang="en-US"/>
           </a:p>
@@ -2387,7 +2406,7 @@
           <p:cNvPr id="6" name="Footer Placeholder 5">
             <a:extLst>
               <a:ext uri="{FF2B5EF4-FFF2-40B4-BE49-F238E27FC236}">
-                <a16:creationId xmlns:a16="http://schemas.microsoft.com/office/drawing/2014/main" xmlns="" id="{7DDFE526-7D20-4EC0-9624-E779812957B3}"/>
+                <a16:creationId xmlns="" xmlns:a16="http://schemas.microsoft.com/office/drawing/2014/main" id="{7DDFE526-7D20-4EC0-9624-E779812957B3}"/>
               </a:ext>
             </a:extLst>
           </p:cNvPr>
@@ -2412,7 +2431,7 @@
           <p:cNvPr id="7" name="Slide Number Placeholder 6">
             <a:extLst>
               <a:ext uri="{FF2B5EF4-FFF2-40B4-BE49-F238E27FC236}">
-                <a16:creationId xmlns:a16="http://schemas.microsoft.com/office/drawing/2014/main" xmlns="" id="{C7AA82D7-E462-4060-85D6-85CF55540155}"/>
+                <a16:creationId xmlns="" xmlns:a16="http://schemas.microsoft.com/office/drawing/2014/main" id="{C7AA82D7-E462-4060-85D6-85CF55540155}"/>
               </a:ext>
             </a:extLst>
           </p:cNvPr>
@@ -2430,6 +2449,7 @@
           <a:p>
             <a:fld id="{5B03D32D-F1BC-4E9C-97E1-36CFF5B22341}" type="slidenum">
               <a:rPr lang="en-US" smtClean="0"/>
+              <a:pPr/>
               <a:t>‹#›</a:t>
             </a:fld>
             <a:endParaRPr lang="en-US"/>
@@ -2439,7 +2459,7 @@
     </p:spTree>
     <p:extLst>
       <p:ext uri="{BB962C8B-B14F-4D97-AF65-F5344CB8AC3E}">
-        <p14:creationId xmlns:p14="http://schemas.microsoft.com/office/powerpoint/2010/main" val="3830305192"/>
+        <p14:creationId xmlns:p14="http://schemas.microsoft.com/office/powerpoint/2010/main" xmlns="" val="3830305192"/>
       </p:ext>
     </p:extLst>
   </p:cSld>
@@ -2471,7 +2491,7 @@
           <p:cNvPr id="2" name="Title 1">
             <a:extLst>
               <a:ext uri="{FF2B5EF4-FFF2-40B4-BE49-F238E27FC236}">
-                <a16:creationId xmlns:a16="http://schemas.microsoft.com/office/drawing/2014/main" xmlns="" id="{AE5E919B-BF68-4590-8CA9-A51BAC0F750F}"/>
+                <a16:creationId xmlns="" xmlns:a16="http://schemas.microsoft.com/office/drawing/2014/main" id="{AE5E919B-BF68-4590-8CA9-A51BAC0F750F}"/>
               </a:ext>
             </a:extLst>
           </p:cNvPr>
@@ -2508,7 +2528,7 @@
           <p:cNvPr id="3" name="Picture Placeholder 2">
             <a:extLst>
               <a:ext uri="{FF2B5EF4-FFF2-40B4-BE49-F238E27FC236}">
-                <a16:creationId xmlns:a16="http://schemas.microsoft.com/office/drawing/2014/main" xmlns="" id="{A04BC1AA-5C68-47DC-BBF0-1E309865E5AF}"/>
+                <a16:creationId xmlns="" xmlns:a16="http://schemas.microsoft.com/office/drawing/2014/main" id="{A04BC1AA-5C68-47DC-BBF0-1E309865E5AF}"/>
               </a:ext>
             </a:extLst>
           </p:cNvPr>
@@ -2575,7 +2595,7 @@
           <p:cNvPr id="4" name="Text Placeholder 3">
             <a:extLst>
               <a:ext uri="{FF2B5EF4-FFF2-40B4-BE49-F238E27FC236}">
-                <a16:creationId xmlns:a16="http://schemas.microsoft.com/office/drawing/2014/main" xmlns="" id="{0F81A636-7F9C-43EC-B2F2-6FB3323CB79E}"/>
+                <a16:creationId xmlns="" xmlns:a16="http://schemas.microsoft.com/office/drawing/2014/main" id="{0F81A636-7F9C-43EC-B2F2-6FB3323CB79E}"/>
               </a:ext>
             </a:extLst>
           </p:cNvPr>
@@ -2646,7 +2666,7 @@
           <p:cNvPr id="5" name="Date Placeholder 4">
             <a:extLst>
               <a:ext uri="{FF2B5EF4-FFF2-40B4-BE49-F238E27FC236}">
-                <a16:creationId xmlns:a16="http://schemas.microsoft.com/office/drawing/2014/main" xmlns="" id="{7D19410E-A050-4AA2-BC89-EF52EB1C34F6}"/>
+                <a16:creationId xmlns="" xmlns:a16="http://schemas.microsoft.com/office/drawing/2014/main" id="{7D19410E-A050-4AA2-BC89-EF52EB1C34F6}"/>
               </a:ext>
             </a:extLst>
           </p:cNvPr>
@@ -2664,7 +2684,8 @@
           <a:p>
             <a:fld id="{EED1C14C-A143-42F5-B247-D0E800131009}" type="datetimeFigureOut">
               <a:rPr lang="en-US" smtClean="0"/>
-              <a:t>23-Jun-20</a:t>
+              <a:pPr/>
+              <a:t>3/31/2021</a:t>
             </a:fld>
             <a:endParaRPr lang="en-US"/>
           </a:p>
@@ -2675,7 +2696,7 @@
           <p:cNvPr id="6" name="Footer Placeholder 5">
             <a:extLst>
               <a:ext uri="{FF2B5EF4-FFF2-40B4-BE49-F238E27FC236}">
-                <a16:creationId xmlns:a16="http://schemas.microsoft.com/office/drawing/2014/main" xmlns="" id="{B0C23AB0-18A5-4589-926D-C00F68CFEA43}"/>
+                <a16:creationId xmlns="" xmlns:a16="http://schemas.microsoft.com/office/drawing/2014/main" id="{B0C23AB0-18A5-4589-926D-C00F68CFEA43}"/>
               </a:ext>
             </a:extLst>
           </p:cNvPr>
@@ -2700,7 +2721,7 @@
           <p:cNvPr id="7" name="Slide Number Placeholder 6">
             <a:extLst>
               <a:ext uri="{FF2B5EF4-FFF2-40B4-BE49-F238E27FC236}">
-                <a16:creationId xmlns:a16="http://schemas.microsoft.com/office/drawing/2014/main" xmlns="" id="{8754EE52-EECA-4C6E-83E9-6382044D356C}"/>
+                <a16:creationId xmlns="" xmlns:a16="http://schemas.microsoft.com/office/drawing/2014/main" id="{8754EE52-EECA-4C6E-83E9-6382044D356C}"/>
               </a:ext>
             </a:extLst>
           </p:cNvPr>
@@ -2718,6 +2739,7 @@
           <a:p>
             <a:fld id="{5B03D32D-F1BC-4E9C-97E1-36CFF5B22341}" type="slidenum">
               <a:rPr lang="en-US" smtClean="0"/>
+              <a:pPr/>
               <a:t>‹#›</a:t>
             </a:fld>
             <a:endParaRPr lang="en-US"/>
@@ -2727,7 +2749,7 @@
     </p:spTree>
     <p:extLst>
       <p:ext uri="{BB962C8B-B14F-4D97-AF65-F5344CB8AC3E}">
-        <p14:creationId xmlns:p14="http://schemas.microsoft.com/office/powerpoint/2010/main" val="1609688846"/>
+        <p14:creationId xmlns:p14="http://schemas.microsoft.com/office/powerpoint/2010/main" xmlns="" val="1609688846"/>
       </p:ext>
     </p:extLst>
   </p:cSld>
@@ -2764,7 +2786,7 @@
           <p:cNvPr id="2" name="Title Placeholder 1">
             <a:extLst>
               <a:ext uri="{FF2B5EF4-FFF2-40B4-BE49-F238E27FC236}">
-                <a16:creationId xmlns:a16="http://schemas.microsoft.com/office/drawing/2014/main" xmlns="" id="{BC3F6010-77C4-45FE-968C-712199A58514}"/>
+                <a16:creationId xmlns="" xmlns:a16="http://schemas.microsoft.com/office/drawing/2014/main" id="{BC3F6010-77C4-45FE-968C-712199A58514}"/>
               </a:ext>
             </a:extLst>
           </p:cNvPr>
@@ -2802,7 +2824,7 @@
           <p:cNvPr id="3" name="Text Placeholder 2">
             <a:extLst>
               <a:ext uri="{FF2B5EF4-FFF2-40B4-BE49-F238E27FC236}">
-                <a16:creationId xmlns:a16="http://schemas.microsoft.com/office/drawing/2014/main" xmlns="" id="{B19B1B2C-5D5F-46D9-92F5-ECDF2816A1FB}"/>
+                <a16:creationId xmlns="" xmlns:a16="http://schemas.microsoft.com/office/drawing/2014/main" id="{B19B1B2C-5D5F-46D9-92F5-ECDF2816A1FB}"/>
               </a:ext>
             </a:extLst>
           </p:cNvPr>
@@ -2869,7 +2891,7 @@
           <p:cNvPr id="4" name="Date Placeholder 3">
             <a:extLst>
               <a:ext uri="{FF2B5EF4-FFF2-40B4-BE49-F238E27FC236}">
-                <a16:creationId xmlns:a16="http://schemas.microsoft.com/office/drawing/2014/main" xmlns="" id="{60334894-C6F5-46F1-BAA2-AFEA88E68169}"/>
+                <a16:creationId xmlns="" xmlns:a16="http://schemas.microsoft.com/office/drawing/2014/main" id="{60334894-C6F5-46F1-BAA2-AFEA88E68169}"/>
               </a:ext>
             </a:extLst>
           </p:cNvPr>
@@ -2905,7 +2927,8 @@
           <a:p>
             <a:fld id="{EED1C14C-A143-42F5-B247-D0E800131009}" type="datetimeFigureOut">
               <a:rPr lang="en-US" smtClean="0"/>
-              <a:t>23-Jun-20</a:t>
+              <a:pPr/>
+              <a:t>3/31/2021</a:t>
             </a:fld>
             <a:endParaRPr lang="en-US"/>
           </a:p>
@@ -2916,7 +2939,7 @@
           <p:cNvPr id="5" name="Footer Placeholder 4">
             <a:extLst>
               <a:ext uri="{FF2B5EF4-FFF2-40B4-BE49-F238E27FC236}">
-                <a16:creationId xmlns:a16="http://schemas.microsoft.com/office/drawing/2014/main" xmlns="" id="{975B1C84-4663-4022-BBEA-7667FEBCF3FB}"/>
+                <a16:creationId xmlns="" xmlns:a16="http://schemas.microsoft.com/office/drawing/2014/main" id="{975B1C84-4663-4022-BBEA-7667FEBCF3FB}"/>
               </a:ext>
             </a:extLst>
           </p:cNvPr>
@@ -2959,7 +2982,7 @@
           <p:cNvPr id="6" name="Slide Number Placeholder 5">
             <a:extLst>
               <a:ext uri="{FF2B5EF4-FFF2-40B4-BE49-F238E27FC236}">
-                <a16:creationId xmlns:a16="http://schemas.microsoft.com/office/drawing/2014/main" xmlns="" id="{E72820DA-1F3A-421F-A770-A6347089E365}"/>
+                <a16:creationId xmlns="" xmlns:a16="http://schemas.microsoft.com/office/drawing/2014/main" id="{E72820DA-1F3A-421F-A770-A6347089E365}"/>
               </a:ext>
             </a:extLst>
           </p:cNvPr>
@@ -2995,6 +3018,7 @@
           <a:p>
             <a:fld id="{5B03D32D-F1BC-4E9C-97E1-36CFF5B22341}" type="slidenum">
               <a:rPr lang="en-US" smtClean="0"/>
+              <a:pPr/>
               <a:t>‹#›</a:t>
             </a:fld>
             <a:endParaRPr lang="en-US"/>
@@ -3004,7 +3028,7 @@
     </p:spTree>
     <p:extLst>
       <p:ext uri="{BB962C8B-B14F-4D97-AF65-F5344CB8AC3E}">
-        <p14:creationId xmlns:p14="http://schemas.microsoft.com/office/powerpoint/2010/main" val="1904852015"/>
+        <p14:creationId xmlns:p14="http://schemas.microsoft.com/office/powerpoint/2010/main" xmlns="" val="1904852015"/>
       </p:ext>
     </p:extLst>
   </p:cSld>
@@ -3327,7 +3351,7 @@
           <p:cNvPr id="2" name="slide1">
             <a:extLst>
               <a:ext uri="{FF2B5EF4-FFF2-40B4-BE49-F238E27FC236}">
-                <a16:creationId xmlns:a16="http://schemas.microsoft.com/office/drawing/2014/main" xmlns="" id="{C9EE1AE6-38B3-4A2C-8627-29BC9A0C1658}"/>
+                <a16:creationId xmlns="" xmlns:a16="http://schemas.microsoft.com/office/drawing/2014/main" id="{C9EE1AE6-38B3-4A2C-8627-29BC9A0C1658}"/>
               </a:ext>
             </a:extLst>
           </p:cNvPr>
@@ -3355,7 +3379,7 @@
           <p:cNvPr id="3" name="slide1">
             <a:extLst>
               <a:ext uri="{FF2B5EF4-FFF2-40B4-BE49-F238E27FC236}">
-                <a16:creationId xmlns:a16="http://schemas.microsoft.com/office/drawing/2014/main" xmlns="" id="{0C04224B-1653-4974-B17D-CE92B7A68FA8}"/>
+                <a16:creationId xmlns="" xmlns:a16="http://schemas.microsoft.com/office/drawing/2014/main" id="{0C04224B-1653-4974-B17D-CE92B7A68FA8}"/>
               </a:ext>
             </a:extLst>
           </p:cNvPr>
@@ -3373,27 +3397,39 @@
           <a:p>
             <a:r>
               <a:rPr dirty="0"/>
-              <a:t>File created on: 23-Jun-20 </a:t>
-            </a:r>
-            <a:r>
-              <a:rPr lang="en-US" dirty="0"/>
+              <a:t>File created on: </a:t>
+            </a:r>
+            <a:r>
+              <a:rPr dirty="0" smtClean="0"/>
+              <a:t>23-J</a:t>
+            </a:r>
+            <a:r>
+              <a:rPr lang="en-IN" dirty="0" smtClean="0"/>
+              <a:t>an</a:t>
+            </a:r>
+            <a:r>
+              <a:rPr dirty="0" smtClean="0"/>
+              <a:t>-2</a:t>
+            </a:r>
+            <a:r>
+              <a:rPr lang="en-IN" dirty="0" smtClean="0"/>
+              <a:t>1</a:t>
+            </a:r>
+            <a:r>
+              <a:rPr dirty="0" smtClean="0"/>
               <a:t> </a:t>
             </a:r>
             <a:r>
               <a:rPr lang="en-US" dirty="0" smtClean="0"/>
-              <a:t> by </a:t>
-            </a:r>
-            <a:r>
-              <a:rPr lang="en-US" dirty="0" err="1" smtClean="0"/>
-              <a:t>Utkarsh</a:t>
+              <a:t>  </a:t>
             </a:r>
             <a:r>
               <a:rPr lang="en-US" dirty="0" smtClean="0"/>
-              <a:t> </a:t>
-            </a:r>
-            <a:r>
-              <a:rPr lang="en-US" dirty="0" err="1" smtClean="0"/>
-              <a:t>Yadav</a:t>
+              <a:t>by </a:t>
+            </a:r>
+            <a:r>
+              <a:rPr lang="en-US" smtClean="0"/>
+              <a:t>Taher Kayamkhani</a:t>
             </a:r>
             <a:endParaRPr dirty="0"/>
           </a:p>
@@ -3402,7 +3438,7 @@
     </p:spTree>
     <p:extLst>
       <p:ext uri="{BB962C8B-B14F-4D97-AF65-F5344CB8AC3E}">
-        <p14:creationId xmlns:p14="http://schemas.microsoft.com/office/powerpoint/2010/main" val="95992585"/>
+        <p14:creationId xmlns:p14="http://schemas.microsoft.com/office/powerpoint/2010/main" xmlns="" val="95992585"/>
       </p:ext>
     </p:extLst>
   </p:cSld>
@@ -3434,7 +3470,7 @@
           <p:cNvPr id="2" name="slide2" descr="Stock Price Tesla">
             <a:extLst>
               <a:ext uri="{FF2B5EF4-FFF2-40B4-BE49-F238E27FC236}">
-                <a16:creationId xmlns:a16="http://schemas.microsoft.com/office/drawing/2014/main" xmlns="" id="{F463F560-632C-4550-A470-05BDB6A4A41C}"/>
+                <a16:creationId xmlns="" xmlns:a16="http://schemas.microsoft.com/office/drawing/2014/main" id="{F463F560-632C-4550-A470-05BDB6A4A41C}"/>
               </a:ext>
             </a:extLst>
           </p:cNvPr>
@@ -3444,10 +3480,10 @@
           <p:nvPr/>
         </p:nvPicPr>
         <p:blipFill>
-          <a:blip r:embed="rId2">
+          <a:blip r:embed="rId2" cstate="print">
             <a:extLst>
               <a:ext uri="{28A0092B-C50C-407E-A947-70E740481C1C}">
-                <a14:useLocalDpi xmlns:a14="http://schemas.microsoft.com/office/drawing/2010/main" val="0"/>
+                <a14:useLocalDpi xmlns:a14="http://schemas.microsoft.com/office/drawing/2010/main" xmlns="" val="0"/>
               </a:ext>
             </a:extLst>
           </a:blip>
@@ -3468,7 +3504,7 @@
     </p:spTree>
     <p:extLst>
       <p:ext uri="{BB962C8B-B14F-4D97-AF65-F5344CB8AC3E}">
-        <p14:creationId xmlns:p14="http://schemas.microsoft.com/office/powerpoint/2010/main" val="95992585"/>
+        <p14:creationId xmlns:p14="http://schemas.microsoft.com/office/powerpoint/2010/main" xmlns="" val="95992585"/>
       </p:ext>
     </p:extLst>
   </p:cSld>
@@ -3767,7 +3803,7 @@
   <a:extraClrSchemeLst/>
   <a:extLst>
     <a:ext uri="{05A4C25C-085E-4340-85A3-A5531E510DB2}">
-      <thm15:themeFamily xmlns:thm15="http://schemas.microsoft.com/office/thememl/2012/main" xmlns="" name="Office Theme" id="{62F939B6-93AF-4DB8-9C6B-D6C7DFDC589F}" vid="{4A3C46E8-61CC-4603-A589-7422A47A8E4A}"/>
+      <thm15:themeFamily xmlns="" xmlns:thm15="http://schemas.microsoft.com/office/thememl/2012/main" name="Office Theme" id="{62F939B6-93AF-4DB8-9C6B-D6C7DFDC589F}" vid="{4A3C46E8-61CC-4603-A589-7422A47A8E4A}"/>
     </a:ext>
   </a:extLst>
 </a:theme>

</xml_diff>